<commit_message>
Presentation style. Hell yes.
</commit_message>
<xml_diff>
--- a/Presentations/Sept 5 - Class 1.pptx
+++ b/Presentations/Sept 5 - Class 1.pptx
@@ -20,9 +20,8 @@
     <p:sldId id="273" r:id="rId14"/>
     <p:sldId id="274" r:id="rId15"/>
     <p:sldId id="268" r:id="rId16"/>
-    <p:sldId id="269" r:id="rId17"/>
-    <p:sldId id="270" r:id="rId18"/>
-    <p:sldId id="271" r:id="rId19"/>
+    <p:sldId id="270" r:id="rId17"/>
+    <p:sldId id="271" r:id="rId18"/>
   </p:sldIdLst>
   <p:sldSz cx="12192000" cy="6858000"/>
   <p:notesSz cx="6858000" cy="9144000"/>
@@ -264,7 +263,7 @@
           <a:p>
             <a:fld id="{D65F7E7C-9DB5-463E-B359-79A0FA341C43}" type="datetimeFigureOut">
               <a:rPr lang="en-US" smtClean="0"/>
-              <a:t>9/4/2017</a:t>
+              <a:t>9/5/2017</a:t>
             </a:fld>
             <a:endParaRPr lang="en-US"/>
           </a:p>
@@ -434,7 +433,7 @@
           <a:p>
             <a:fld id="{D65F7E7C-9DB5-463E-B359-79A0FA341C43}" type="datetimeFigureOut">
               <a:rPr lang="en-US" smtClean="0"/>
-              <a:t>9/4/2017</a:t>
+              <a:t>9/5/2017</a:t>
             </a:fld>
             <a:endParaRPr lang="en-US"/>
           </a:p>
@@ -614,7 +613,7 @@
           <a:p>
             <a:fld id="{D65F7E7C-9DB5-463E-B359-79A0FA341C43}" type="datetimeFigureOut">
               <a:rPr lang="en-US" smtClean="0"/>
-              <a:t>9/4/2017</a:t>
+              <a:t>9/5/2017</a:t>
             </a:fld>
             <a:endParaRPr lang="en-US"/>
           </a:p>
@@ -784,7 +783,7 @@
           <a:p>
             <a:fld id="{D65F7E7C-9DB5-463E-B359-79A0FA341C43}" type="datetimeFigureOut">
               <a:rPr lang="en-US" smtClean="0"/>
-              <a:t>9/4/2017</a:t>
+              <a:t>9/5/2017</a:t>
             </a:fld>
             <a:endParaRPr lang="en-US"/>
           </a:p>
@@ -1030,7 +1029,7 @@
           <a:p>
             <a:fld id="{D65F7E7C-9DB5-463E-B359-79A0FA341C43}" type="datetimeFigureOut">
               <a:rPr lang="en-US" smtClean="0"/>
-              <a:t>9/4/2017</a:t>
+              <a:t>9/5/2017</a:t>
             </a:fld>
             <a:endParaRPr lang="en-US"/>
           </a:p>
@@ -1262,7 +1261,7 @@
           <a:p>
             <a:fld id="{D65F7E7C-9DB5-463E-B359-79A0FA341C43}" type="datetimeFigureOut">
               <a:rPr lang="en-US" smtClean="0"/>
-              <a:t>9/4/2017</a:t>
+              <a:t>9/5/2017</a:t>
             </a:fld>
             <a:endParaRPr lang="en-US"/>
           </a:p>
@@ -1629,7 +1628,7 @@
           <a:p>
             <a:fld id="{D65F7E7C-9DB5-463E-B359-79A0FA341C43}" type="datetimeFigureOut">
               <a:rPr lang="en-US" smtClean="0"/>
-              <a:t>9/4/2017</a:t>
+              <a:t>9/5/2017</a:t>
             </a:fld>
             <a:endParaRPr lang="en-US"/>
           </a:p>
@@ -1747,7 +1746,7 @@
           <a:p>
             <a:fld id="{D65F7E7C-9DB5-463E-B359-79A0FA341C43}" type="datetimeFigureOut">
               <a:rPr lang="en-US" smtClean="0"/>
-              <a:t>9/4/2017</a:t>
+              <a:t>9/5/2017</a:t>
             </a:fld>
             <a:endParaRPr lang="en-US"/>
           </a:p>
@@ -1842,7 +1841,7 @@
           <a:p>
             <a:fld id="{D65F7E7C-9DB5-463E-B359-79A0FA341C43}" type="datetimeFigureOut">
               <a:rPr lang="en-US" smtClean="0"/>
-              <a:t>9/4/2017</a:t>
+              <a:t>9/5/2017</a:t>
             </a:fld>
             <a:endParaRPr lang="en-US"/>
           </a:p>
@@ -2119,7 +2118,7 @@
           <a:p>
             <a:fld id="{D65F7E7C-9DB5-463E-B359-79A0FA341C43}" type="datetimeFigureOut">
               <a:rPr lang="en-US" smtClean="0"/>
-              <a:t>9/4/2017</a:t>
+              <a:t>9/5/2017</a:t>
             </a:fld>
             <a:endParaRPr lang="en-US"/>
           </a:p>
@@ -2376,7 +2375,7 @@
           <a:p>
             <a:fld id="{D65F7E7C-9DB5-463E-B359-79A0FA341C43}" type="datetimeFigureOut">
               <a:rPr lang="en-US" smtClean="0"/>
-              <a:t>9/4/2017</a:t>
+              <a:t>9/5/2017</a:t>
             </a:fld>
             <a:endParaRPr lang="en-US"/>
           </a:p>
@@ -2589,7 +2588,7 @@
           <a:p>
             <a:fld id="{D65F7E7C-9DB5-463E-B359-79A0FA341C43}" type="datetimeFigureOut">
               <a:rPr lang="en-US" smtClean="0"/>
-              <a:t>9/4/2017</a:t>
+              <a:t>9/5/2017</a:t>
             </a:fld>
             <a:endParaRPr lang="en-US"/>
           </a:p>
@@ -4266,36 +4265,6 @@
           <a:chExt cx="0" cy="0"/>
         </a:xfrm>
       </p:grpSpPr>
-    </p:spTree>
-    <p:extLst>
-      <p:ext uri="{BB962C8B-B14F-4D97-AF65-F5344CB8AC3E}">
-        <p14:creationId xmlns:p14="http://schemas.microsoft.com/office/powerpoint/2010/main" val="705735576"/>
-      </p:ext>
-    </p:extLst>
-  </p:cSld>
-  <p:clrMapOvr>
-    <a:masterClrMapping/>
-  </p:clrMapOvr>
-</p:sld>
-</file>
-
-<file path=ppt/slides/slide17.xml><?xml version="1.0" encoding="utf-8"?>
-<p:sld xmlns:a="http://schemas.openxmlformats.org/drawingml/2006/main" xmlns:r="http://schemas.openxmlformats.org/officeDocument/2006/relationships" xmlns:p="http://schemas.openxmlformats.org/presentationml/2006/main">
-  <p:cSld>
-    <p:spTree>
-      <p:nvGrpSpPr>
-        <p:cNvPr id="1" name=""/>
-        <p:cNvGrpSpPr/>
-        <p:nvPr/>
-      </p:nvGrpSpPr>
-      <p:grpSpPr>
-        <a:xfrm>
-          <a:off x="0" y="0"/>
-          <a:ext cx="0" cy="0"/>
-          <a:chOff x="0" y="0"/>
-          <a:chExt cx="0" cy="0"/>
-        </a:xfrm>
-      </p:grpSpPr>
       <p:sp>
         <p:nvSpPr>
           <p:cNvPr id="2" name="Title 1">
@@ -4319,7 +4288,9 @@
           <a:p>
             <a:pPr algn="ctr"/>
             <a:r>
-              <a:rPr lang="en-US" b="1" dirty="0"/>
+              <a:rPr lang="en-US" b="1" dirty="0">
+                <a:hlinkClick r:id="rId2"/>
+              </a:rPr>
               <a:t>https://cdpn.io/e/ZyrdYG</a:t>
             </a:r>
             <a:br>
@@ -4346,7 +4317,7 @@
 </p:sld>
 </file>
 
-<file path=ppt/slides/slide18.xml><?xml version="1.0" encoding="utf-8"?>
+<file path=ppt/slides/slide17.xml><?xml version="1.0" encoding="utf-8"?>
 <p:sld xmlns:a="http://schemas.openxmlformats.org/drawingml/2006/main" xmlns:r="http://schemas.openxmlformats.org/officeDocument/2006/relationships" xmlns:p="http://schemas.openxmlformats.org/presentationml/2006/main">
   <p:cSld>
     <p:spTree>
@@ -4554,7 +4525,9 @@
           <a:lstStyle/>
           <a:p>
             <a:r>
-              <a:rPr lang="en-US" dirty="0"/>
+              <a:rPr lang="en-US" dirty="0">
+                <a:latin typeface="+mn-lt"/>
+              </a:rPr>
               <a:t>My Name is </a:t>
             </a:r>
             <a:r>
@@ -4588,7 +4561,9 @@
           <a:lstStyle/>
           <a:p>
             <a:r>
-              <a:rPr lang="en-US" dirty="0"/>
+              <a:rPr lang="en-US" dirty="0">
+                <a:latin typeface="+mj-lt"/>
+              </a:rPr>
               <a:t>crhallberg@gmail.com</a:t>
             </a:r>
           </a:p>
@@ -4701,7 +4676,7 @@
           </a:p>
           <a:p>
             <a:r>
-              <a:rPr lang="en-US" dirty="0"/>
+              <a:rPr lang="en-US" b="1" i="1" dirty="0"/>
               <a:t>Make: Getting Started with p5.js</a:t>
             </a:r>
           </a:p>
@@ -4714,7 +4689,7 @@
           </a:p>
           <a:p>
             <a:r>
-              <a:rPr lang="en-US" dirty="0"/>
+              <a:rPr lang="en-US" b="1" i="1" dirty="0"/>
               <a:t>JavaScript: The Good Parts</a:t>
             </a:r>
           </a:p>
@@ -4732,7 +4707,10 @@
           </a:p>
           <a:p>
             <a:r>
-              <a:rPr lang="en-US" dirty="0"/>
+              <a:rPr lang="en-US" b="1" i="1" dirty="0">
+                <a:latin typeface="Source Sans Pro" panose="020B0503030403020204" pitchFamily="34" charset="0"/>
+                <a:ea typeface="Source Sans Pro" panose="020B0503030403020204" pitchFamily="34" charset="0"/>
+              </a:rPr>
               <a:t>The Nature of Code </a:t>
             </a:r>
           </a:p>
@@ -4849,13 +4827,8 @@
           <a:p>
             <a:r>
               <a:rPr lang="en-US" dirty="0"/>
-              <a:t>GitHub: https://github.com/crhallberg</a:t>
-            </a:r>
-            <a:r>
-              <a:rPr lang="en-US"/>
-              <a:t>/IMM120/tree/fall17</a:t>
-            </a:r>
-            <a:endParaRPr lang="en-US" dirty="0"/>
+              <a:t>GitHub: https://github.com/crhallberg/IMM120</a:t>
+            </a:r>
           </a:p>
           <a:p>
             <a:r>
@@ -4953,7 +4926,7 @@
           <a:p>
             <a:r>
               <a:rPr lang="en-US" dirty="0"/>
-              <a:t>There are 14 classes in this semester</a:t>
+              <a:t>There are 13 classes in this semester and a final lab</a:t>
             </a:r>
           </a:p>
           <a:p>
@@ -5403,8 +5376,8 @@
         </p:blipFill>
         <p:spPr bwMode="auto">
           <a:xfrm>
-            <a:off x="4101441" y="1690688"/>
-            <a:ext cx="3989117" cy="5167312"/>
+            <a:off x="6053664" y="0"/>
+            <a:ext cx="5300136" cy="6865544"/>
           </a:xfrm>
           <a:prstGeom prst="rect">
             <a:avLst/>
@@ -5437,7 +5410,7 @@
 <file path=ppt/theme/theme1.xml><?xml version="1.0" encoding="utf-8"?>
 <a:theme xmlns:a="http://schemas.openxmlformats.org/drawingml/2006/main" name="Office Theme">
   <a:themeElements>
-    <a:clrScheme name="Office Theme">
+    <a:clrScheme name="Blue II">
       <a:dk1>
         <a:sysClr val="windowText" lastClr="000000"/>
       </a:dk1>
@@ -5445,106 +5418,46 @@
         <a:sysClr val="window" lastClr="FFFFFF"/>
       </a:lt1>
       <a:dk2>
-        <a:srgbClr val="44546A"/>
+        <a:srgbClr val="335B74"/>
       </a:dk2>
       <a:lt2>
-        <a:srgbClr val="E7E6E6"/>
+        <a:srgbClr val="DFE3E5"/>
       </a:lt2>
       <a:accent1>
-        <a:srgbClr val="4472C4"/>
+        <a:srgbClr val="1CADE4"/>
       </a:accent1>
       <a:accent2>
-        <a:srgbClr val="ED7D31"/>
+        <a:srgbClr val="2683C6"/>
       </a:accent2>
       <a:accent3>
-        <a:srgbClr val="A5A5A5"/>
+        <a:srgbClr val="27CED7"/>
       </a:accent3>
       <a:accent4>
-        <a:srgbClr val="FFC000"/>
+        <a:srgbClr val="42BA97"/>
       </a:accent4>
       <a:accent5>
-        <a:srgbClr val="5B9BD5"/>
+        <a:srgbClr val="3E8853"/>
       </a:accent5>
       <a:accent6>
-        <a:srgbClr val="70AD47"/>
+        <a:srgbClr val="62A39F"/>
       </a:accent6>
       <a:hlink>
-        <a:srgbClr val="0563C1"/>
+        <a:srgbClr val="6EAC1C"/>
       </a:hlink>
       <a:folHlink>
-        <a:srgbClr val="954F72"/>
+        <a:srgbClr val="B26B02"/>
       </a:folHlink>
     </a:clrScheme>
-    <a:fontScheme name="Office Theme">
+    <a:fontScheme name="Source Sans Pro">
       <a:majorFont>
-        <a:latin typeface="Calibri Light" panose="020F0302020204030204"/>
+        <a:latin typeface="Source Sans Pro Black"/>
         <a:ea typeface=""/>
         <a:cs typeface=""/>
-        <a:font script="Jpan" typeface="游ゴシック Light"/>
-        <a:font script="Hang" typeface="맑은 고딕"/>
-        <a:font script="Hans" typeface="等线 Light"/>
-        <a:font script="Hant" typeface="新細明體"/>
-        <a:font script="Arab" typeface="Times New Roman"/>
-        <a:font script="Hebr" typeface="Times New Roman"/>
-        <a:font script="Thai" typeface="Angsana New"/>
-        <a:font script="Ethi" typeface="Nyala"/>
-        <a:font script="Beng" typeface="Vrinda"/>
-        <a:font script="Gujr" typeface="Shruti"/>
-        <a:font script="Khmr" typeface="MoolBoran"/>
-        <a:font script="Knda" typeface="Tunga"/>
-        <a:font script="Guru" typeface="Raavi"/>
-        <a:font script="Cans" typeface="Euphemia"/>
-        <a:font script="Cher" typeface="Plantagenet Cherokee"/>
-        <a:font script="Yiii" typeface="Microsoft Yi Baiti"/>
-        <a:font script="Tibt" typeface="Microsoft Himalaya"/>
-        <a:font script="Thaa" typeface="MV Boli"/>
-        <a:font script="Deva" typeface="Mangal"/>
-        <a:font script="Telu" typeface="Gautami"/>
-        <a:font script="Taml" typeface="Latha"/>
-        <a:font script="Syrc" typeface="Estrangelo Edessa"/>
-        <a:font script="Orya" typeface="Kalinga"/>
-        <a:font script="Mlym" typeface="Kartika"/>
-        <a:font script="Laoo" typeface="DokChampa"/>
-        <a:font script="Sinh" typeface="Iskoola Pota"/>
-        <a:font script="Mong" typeface="Mongolian Baiti"/>
-        <a:font script="Viet" typeface="Times New Roman"/>
-        <a:font script="Uigh" typeface="Microsoft Uighur"/>
-        <a:font script="Geor" typeface="Sylfaen"/>
       </a:majorFont>
       <a:minorFont>
-        <a:latin typeface="Calibri" panose="020F0502020204030204"/>
+        <a:latin typeface="Source Sans Pro"/>
         <a:ea typeface=""/>
         <a:cs typeface=""/>
-        <a:font script="Jpan" typeface="游ゴシック"/>
-        <a:font script="Hang" typeface="맑은 고딕"/>
-        <a:font script="Hans" typeface="等线"/>
-        <a:font script="Hant" typeface="新細明體"/>
-        <a:font script="Arab" typeface="Arial"/>
-        <a:font script="Hebr" typeface="Arial"/>
-        <a:font script="Thai" typeface="Cordia New"/>
-        <a:font script="Ethi" typeface="Nyala"/>
-        <a:font script="Beng" typeface="Vrinda"/>
-        <a:font script="Gujr" typeface="Shruti"/>
-        <a:font script="Khmr" typeface="DaunPenh"/>
-        <a:font script="Knda" typeface="Tunga"/>
-        <a:font script="Guru" typeface="Raavi"/>
-        <a:font script="Cans" typeface="Euphemia"/>
-        <a:font script="Cher" typeface="Plantagenet Cherokee"/>
-        <a:font script="Yiii" typeface="Microsoft Yi Baiti"/>
-        <a:font script="Tibt" typeface="Microsoft Himalaya"/>
-        <a:font script="Thaa" typeface="MV Boli"/>
-        <a:font script="Deva" typeface="Mangal"/>
-        <a:font script="Telu" typeface="Gautami"/>
-        <a:font script="Taml" typeface="Latha"/>
-        <a:font script="Syrc" typeface="Estrangelo Edessa"/>
-        <a:font script="Orya" typeface="Kalinga"/>
-        <a:font script="Mlym" typeface="Kartika"/>
-        <a:font script="Laoo" typeface="DokChampa"/>
-        <a:font script="Sinh" typeface="Iskoola Pota"/>
-        <a:font script="Mong" typeface="Mongolian Baiti"/>
-        <a:font script="Viet" typeface="Arial"/>
-        <a:font script="Uigh" typeface="Microsoft Uighur"/>
-        <a:font script="Geor" typeface="Sylfaen"/>
       </a:minorFont>
     </a:fontScheme>
     <a:fmtScheme name="Office Theme">

</xml_diff>